<commit_message>
fixed one spelling error
</commit_message>
<xml_diff>
--- a/movie_trends__ar_dl_nm_rh.pptx
+++ b/movie_trends__ar_dl_nm_rh.pptx
@@ -232,7 +232,7 @@
           <a:p>
             <a:fld id="{130DC6FD-16BD-4C91-8A1D-CE30DFD9FB4C}" type="datetimeFigureOut">
               <a:rPr lang="en-US" smtClean="0"/>
-              <a:t>10/1/2019</a:t>
+              <a:t>10/2/2019</a:t>
             </a:fld>
             <a:endParaRPr lang="en-US"/>
           </a:p>
@@ -409,7 +409,7 @@
           <a:p>
             <a:fld id="{D573DE63-6844-4883-B85D-78ADD8B6137B}" type="datetimeFigureOut">
               <a:rPr lang="en-US" smtClean="0"/>
-              <a:t>10/1/2019</a:t>
+              <a:t>10/2/2019</a:t>
             </a:fld>
             <a:endParaRPr lang="en-US"/>
           </a:p>
@@ -2904,7 +2904,7 @@
           <a:p>
             <a:fld id="{1855663E-A9A6-46CF-8948-C5CADEC4015F}" type="datetimeFigureOut">
               <a:rPr lang="en-US" smtClean="0"/>
-              <a:t>10/1/2019</a:t>
+              <a:t>10/2/2019</a:t>
             </a:fld>
             <a:endParaRPr lang="en-US"/>
           </a:p>
@@ -3142,7 +3142,7 @@
           <a:p>
             <a:fld id="{1855663E-A9A6-46CF-8948-C5CADEC4015F}" type="datetimeFigureOut">
               <a:rPr lang="en-US" smtClean="0"/>
-              <a:t>10/1/2019</a:t>
+              <a:t>10/2/2019</a:t>
             </a:fld>
             <a:endParaRPr lang="en-US"/>
           </a:p>
@@ -3322,7 +3322,7 @@
           <a:p>
             <a:fld id="{1855663E-A9A6-46CF-8948-C5CADEC4015F}" type="datetimeFigureOut">
               <a:rPr lang="en-US" smtClean="0"/>
-              <a:t>10/1/2019</a:t>
+              <a:t>10/2/2019</a:t>
             </a:fld>
             <a:endParaRPr lang="en-US"/>
           </a:p>
@@ -3500,7 +3500,7 @@
           <a:p>
             <a:fld id="{1855663E-A9A6-46CF-8948-C5CADEC4015F}" type="datetimeFigureOut">
               <a:rPr lang="en-US" smtClean="0"/>
-              <a:t>10/1/2019</a:t>
+              <a:t>10/2/2019</a:t>
             </a:fld>
             <a:endParaRPr lang="en-US"/>
           </a:p>
@@ -3776,7 +3776,7 @@
           <a:p>
             <a:fld id="{1855663E-A9A6-46CF-8948-C5CADEC4015F}" type="datetimeFigureOut">
               <a:rPr lang="en-US" smtClean="0"/>
-              <a:t>10/1/2019</a:t>
+              <a:t>10/2/2019</a:t>
             </a:fld>
             <a:endParaRPr lang="en-US"/>
           </a:p>
@@ -4977,7 +4977,7 @@
           <a:p>
             <a:fld id="{1855663E-A9A6-46CF-8948-C5CADEC4015F}" type="datetimeFigureOut">
               <a:rPr lang="en-US" smtClean="0"/>
-              <a:t>10/1/2019</a:t>
+              <a:t>10/2/2019</a:t>
             </a:fld>
             <a:endParaRPr lang="en-US"/>
           </a:p>
@@ -5367,7 +5367,7 @@
           <a:p>
             <a:fld id="{1855663E-A9A6-46CF-8948-C5CADEC4015F}" type="datetimeFigureOut">
               <a:rPr lang="en-US" smtClean="0"/>
-              <a:t>10/1/2019</a:t>
+              <a:t>10/2/2019</a:t>
             </a:fld>
             <a:endParaRPr lang="en-US"/>
           </a:p>
@@ -5490,7 +5490,7 @@
           <a:p>
             <a:fld id="{1855663E-A9A6-46CF-8948-C5CADEC4015F}" type="datetimeFigureOut">
               <a:rPr lang="en-US" smtClean="0"/>
-              <a:t>10/1/2019</a:t>
+              <a:t>10/2/2019</a:t>
             </a:fld>
             <a:endParaRPr lang="en-US"/>
           </a:p>
@@ -5585,7 +5585,7 @@
           <a:p>
             <a:fld id="{1855663E-A9A6-46CF-8948-C5CADEC4015F}" type="datetimeFigureOut">
               <a:rPr lang="en-US" smtClean="0"/>
-              <a:t>10/1/2019</a:t>
+              <a:t>10/2/2019</a:t>
             </a:fld>
             <a:endParaRPr lang="en-US"/>
           </a:p>
@@ -6348,7 +6348,7 @@
           <a:p>
             <a:fld id="{1855663E-A9A6-46CF-8948-C5CADEC4015F}" type="datetimeFigureOut">
               <a:rPr lang="en-US" smtClean="0"/>
-              <a:t>10/1/2019</a:t>
+              <a:t>10/2/2019</a:t>
             </a:fld>
             <a:endParaRPr lang="en-US"/>
           </a:p>
@@ -7188,7 +7188,7 @@
           <a:p>
             <a:fld id="{1855663E-A9A6-46CF-8948-C5CADEC4015F}" type="datetimeFigureOut">
               <a:rPr lang="en-US" smtClean="0"/>
-              <a:t>10/1/2019</a:t>
+              <a:t>10/2/2019</a:t>
             </a:fld>
             <a:endParaRPr lang="en-US"/>
           </a:p>
@@ -7415,7 +7415,7 @@
           <a:p>
             <a:fld id="{1855663E-A9A6-46CF-8948-C5CADEC4015F}" type="datetimeFigureOut">
               <a:rPr lang="en-US" smtClean="0"/>
-              <a:t>10/1/2019</a:t>
+              <a:t>10/2/2019</a:t>
             </a:fld>
             <a:endParaRPr lang="en-US"/>
           </a:p>
@@ -8512,8 +8512,8 @@
   <p:clrMapOvr>
     <a:masterClrMapping/>
   </p:clrMapOvr>
-  <mc:AlternateContent xmlns:mc="http://schemas.openxmlformats.org/markup-compatibility/2006">
-    <mc:Choice xmlns:p15="http://schemas.microsoft.com/office/powerpoint/2012/main" Requires="p15">
+  <mc:AlternateContent xmlns:mc="http://schemas.openxmlformats.org/markup-compatibility/2006" xmlns:p15="http://schemas.microsoft.com/office/powerpoint/2012/main">
+    <mc:Choice Requires="p15">
       <p:transition xmlns:p14="http://schemas.microsoft.com/office/powerpoint/2010/main" spd="slow" p14:dur="2000">
         <p15:prstTrans prst="curtains"/>
         <p:sndAc>
@@ -8523,12 +8523,12 @@
         </p:sndAc>
       </p:transition>
     </mc:Choice>
-    <mc:Fallback>
+    <mc:Fallback xmlns="">
       <p:transition spd="slow">
         <p:fade/>
         <p:sndAc>
           <p:stSnd>
-            <p:snd r:embed="rId2" name="drumroll.wav"/>
+            <p:snd r:embed="rId3" name="drumroll.wav"/>
           </p:stSnd>
         </p:sndAc>
       </p:transition>
@@ -18179,7 +18179,7 @@
             </a:r>
             <a:r>
               <a:rPr lang="en-US" sz="2000" dirty="0"/>
-              <a:t> for a movie is significantly higher for IMDB, compare to Rotten Tomatoes and Metacritic</a:t>
+              <a:t> for movies is significantly higher for IMDB, compare to Rotten Tomatoes and Metacritic</a:t>
             </a:r>
           </a:p>
           <a:p>

</xml_diff>